<commit_message>
Updated model plots, fixed issue with code not wrapping on pdf
</commit_message>
<xml_diff>
--- a/Presentation_RMD.pptx
+++ b/Presentation_RMD.pptx
@@ -21,6 +21,10 @@
     <p:sldId id="269" r:id="rId15"/>
     <p:sldId id="270" r:id="rId16"/>
     <p:sldId id="271" r:id="rId17"/>
+    <p:sldId id="272" r:id="rId18"/>
+    <p:sldId id="273" r:id="rId19"/>
+    <p:sldId id="274" r:id="rId20"/>
+    <p:sldId id="275" r:id="rId21"/>
   </p:sldIdLst>
   <p:sldSz cx="9144000" cy="6858000" type="screen4x3"/>
   <p:notesSz cx="6858000" cy="9144000"/>
@@ -3528,51 +3532,19 @@
 ##     second_check + third_check, data = df_weekly)
 ## 
 ## Residuals:
-##      Min       1Q   Median 
-## -0.34163 -0.04494  0.00693 
-##       3Q      Max 
-##  0.04757  0.41405 
+##      Min       1Q   Median       3Q      Max 
+## -0.34163 -0.04494  0.00693  0.04757  0.41405 
 ## 
 ## Coefficients:
-##                            Estimate
-## (Intercept)               -0.041870
-## gps_retail_and_recreation  0.308678
-## emp                        0.185988
-## first_check                0.044965
-## second_check               0.133771
-## third_check                0.013451
-##                           Std. Error
-## (Intercept)                 0.003174
-## gps_retail_and_recreation   0.012020
-## emp                         0.025534
-## first_check                 0.003733
-## second_check                0.004405
-## third_check                 0.004700
-##                           t value
-## (Intercept)               -13.190
-## gps_retail_and_recreation  25.681
-## emp                         7.284
-## first_check                12.045
-## second_check               30.367
-## third_check                 2.862
-##                           Pr(&gt;|t|)
-## (Intercept)                &lt; 2e-16
-## gps_retail_and_recreation  &lt; 2e-16
-## emp                       3.81e-13
-## first_check                &lt; 2e-16
-## second_check               &lt; 2e-16
-## third_check                0.00423
-##                              
-## (Intercept)               ***
-## gps_retail_and_recreation ***
-## emp                       ***
-## first_check               ***
-## second_check              ***
-## third_check               ** 
+##                            Estimate Std. Error t value Pr(&gt;|t|)    
+## (Intercept)               -0.041870   0.003174 -13.190  &lt; 2e-16 ***
+## gps_retail_and_recreation  0.308678   0.012020  25.681  &lt; 2e-16 ***
+## emp                        0.185988   0.025534   7.284 3.81e-13 ***
+## first_check                0.044965   0.003733  12.045  &lt; 2e-16 ***
+## second_check               0.133771   0.004405  30.367  &lt; 2e-16 ***
+## third_check                0.013451   0.004700   2.862  0.00423 ** 
 ## ---
-## Signif. codes:  
-##   0 '***' 0.001 '**' 0.01
-##   '*' 0.05 '.' 0.1 ' ' 1
+## Signif. codes:  0 '***' 0.001 '**' 0.01 '*' 0.05 '.' 0.1 ' ' 1
 ## 
 ## Residual standard error: 0.08172 on 4482 degrees of freedom
 ## Multiple R-squared:  0.6325, Adjusted R-squared:  0.6321 
@@ -3655,108 +3627,36 @@
           <a:chExt cx="0" cy="0"/>
         </a:xfrm>
       </p:grpSpPr>
-      <p:sp>
-        <p:nvSpPr>
-          <p:cNvPr id="2" name="Title 1"/>
-          <p:cNvSpPr>
-            <a:spLocks noGrp="1"/>
-          </p:cNvSpPr>
-          <p:nvPr>
-            <p:ph type="title"/>
-          </p:nvPr>
-        </p:nvSpPr>
-        <p:spPr/>
-        <p:txBody>
-          <a:bodyPr/>
-          <a:lstStyle/>
-          <a:p>
-            <a:pPr lvl="0" marL="0" indent="0">
-              <a:buNone/>
-            </a:pPr>
-            <a:r>
-              <a:rPr/>
-              <a:t>Summarize</a:t>
-            </a:r>
-            <a:r>
-              <a:rPr/>
-              <a:t> </a:t>
-            </a:r>
-            <a:r>
-              <a:rPr/>
-              <a:t>the</a:t>
-            </a:r>
-            <a:r>
-              <a:rPr/>
-              <a:t> </a:t>
-            </a:r>
-            <a:r>
-              <a:rPr/>
-              <a:t>Model</a:t>
-            </a:r>
-          </a:p>
-        </p:txBody>
-      </p:sp>
-      <p:sp>
-        <p:nvSpPr>
-          <p:cNvPr id="3" name="Content Placeholder 2"/>
-          <p:cNvSpPr>
-            <a:spLocks noGrp="1"/>
-          </p:cNvSpPr>
-          <p:nvPr>
-            <p:ph idx="1"/>
-          </p:nvPr>
-        </p:nvSpPr>
-        <p:spPr/>
-        <p:txBody>
-          <a:bodyPr/>
-          <a:lstStyle/>
-          <a:p>
-            <a:pPr lvl="0" marL="0" indent="0">
-              <a:spcBef>
-                <a:spcPts val="3000"/>
-              </a:spcBef>
-              <a:buNone/>
-            </a:pPr>
-            <a:r>
-              <a:rPr b="1"/>
-              <a:t>It’s really bad, to be blunt.</a:t>
-            </a:r>
-          </a:p>
-          <a:p>
-            <a:pPr lvl="0" marL="0" indent="0">
-              <a:spcBef>
-                <a:spcPts val="3000"/>
-              </a:spcBef>
-              <a:buNone/>
-            </a:pPr>
-            <a:r>
-              <a:rPr b="1"/>
-              <a:t>Possible Better Models</a:t>
-            </a:r>
-          </a:p>
-          <a:p>
-            <a:pPr lvl="1"/>
-            <a:r>
-              <a:rPr/>
-              <a:t>Neural Networks</a:t>
-            </a:r>
-          </a:p>
-          <a:p>
-            <a:pPr lvl="1"/>
-            <a:r>
-              <a:rPr/>
-              <a:t>Decision Trees</a:t>
-            </a:r>
-          </a:p>
-          <a:p>
-            <a:pPr lvl="1"/>
-            <a:r>
-              <a:rPr/>
-              <a:t>Time Series Models (LSTM, RNN, etc.)</a:t>
-            </a:r>
-          </a:p>
-        </p:txBody>
-      </p:sp>
+      <p:pic>
+        <p:nvPicPr>
+          <p:cNvPr descr="Presentation_RMD_files/figure-pptx/unnamed-chunk-8-1.png" id="0" name="Picture 1"/>
+          <p:cNvPicPr>
+            <a:picLocks noGrp="1" noChangeAspect="1"/>
+          </p:cNvPicPr>
+          <p:nvPr/>
+        </p:nvPicPr>
+        <p:blipFill>
+          <a:blip r:embed="rId2"/>
+          <a:stretch>
+            <a:fillRect/>
+          </a:stretch>
+        </p:blipFill>
+        <p:spPr bwMode="auto">
+          <a:xfrm>
+            <a:off x="1752600" y="1600200"/>
+            <a:ext cx="5651500" cy="4521200"/>
+          </a:xfrm>
+          <a:prstGeom prst="rect">
+            <a:avLst/>
+          </a:prstGeom>
+          <a:noFill/>
+          <a:ln w="9525">
+            <a:noFill/>
+            <a:headEnd/>
+            <a:tailEnd/>
+          </a:ln>
+        </p:spPr>
+      </p:pic>
     </p:spTree>
   </p:cSld>
 </p:sld>
@@ -3779,77 +3679,36 @@
           <a:chExt cx="0" cy="0"/>
         </a:xfrm>
       </p:grpSpPr>
-      <p:sp>
-        <p:nvSpPr>
-          <p:cNvPr id="2" name="Title 1"/>
-          <p:cNvSpPr>
-            <a:spLocks noGrp="1"/>
-          </p:cNvSpPr>
-          <p:nvPr>
-            <p:ph type="title"/>
-          </p:nvPr>
-        </p:nvSpPr>
-        <p:spPr/>
-        <p:txBody>
-          <a:bodyPr/>
-          <a:lstStyle/>
-          <a:p>
-            <a:pPr lvl="0" marL="0" indent="0">
-              <a:buNone/>
-            </a:pPr>
-            <a:r>
-              <a:rPr/>
-              <a:t>Some</a:t>
-            </a:r>
-            <a:r>
-              <a:rPr/>
-              <a:t> </a:t>
-            </a:r>
-            <a:r>
-              <a:rPr/>
-              <a:t>Possible</a:t>
-            </a:r>
-            <a:r>
-              <a:rPr/>
-              <a:t> </a:t>
-            </a:r>
-            <a:r>
-              <a:rPr/>
-              <a:t>Biases</a:t>
-            </a:r>
-          </a:p>
-        </p:txBody>
-      </p:sp>
-      <p:sp>
-        <p:nvSpPr>
-          <p:cNvPr id="3" name="Content Placeholder 2"/>
-          <p:cNvSpPr>
-            <a:spLocks noGrp="1"/>
-          </p:cNvSpPr>
-          <p:nvPr>
-            <p:ph idx="1"/>
-          </p:nvPr>
-        </p:nvSpPr>
-        <p:spPr/>
-        <p:txBody>
-          <a:bodyPr/>
-          <a:lstStyle/>
-          <a:p>
-            <a:pPr lvl="1"/>
-            <a:r>
-              <a:rPr/>
-              <a:t>Movement data only comes from Google</a:t>
-            </a:r>
-          </a:p>
-          <a:p>
-            <a:pPr lvl="1"/>
-            <a:r>
-              <a:rPr/>
-              <a:t>Effect of stimulus checks won’t fade, because of the way we encoded the data.</a:t>
-            </a:r>
-          </a:p>
-        </p:txBody>
-      </p:sp>
+      <p:pic>
+        <p:nvPicPr>
+          <p:cNvPr descr="Presentation_RMD_files/figure-pptx/unnamed-chunk-9-1.png" id="0" name="Picture 1"/>
+          <p:cNvPicPr>
+            <a:picLocks noGrp="1" noChangeAspect="1"/>
+          </p:cNvPicPr>
+          <p:nvPr/>
+        </p:nvPicPr>
+        <p:blipFill>
+          <a:blip r:embed="rId2"/>
+          <a:stretch>
+            <a:fillRect/>
+          </a:stretch>
+        </p:blipFill>
+        <p:spPr bwMode="auto">
+          <a:xfrm>
+            <a:off x="1752600" y="1600200"/>
+            <a:ext cx="5651500" cy="4521200"/>
+          </a:xfrm>
+          <a:prstGeom prst="rect">
+            <a:avLst/>
+          </a:prstGeom>
+          <a:noFill/>
+          <a:ln w="9525">
+            <a:noFill/>
+            <a:headEnd/>
+            <a:tailEnd/>
+          </a:ln>
+        </p:spPr>
+      </p:pic>
     </p:spTree>
   </p:cSld>
 </p:sld>
@@ -3872,6 +3731,110 @@
           <a:chExt cx="0" cy="0"/>
         </a:xfrm>
       </p:grpSpPr>
+      <p:pic>
+        <p:nvPicPr>
+          <p:cNvPr descr="Presentation_RMD_files/figure-pptx/unnamed-chunk-10-1.png" id="0" name="Picture 1"/>
+          <p:cNvPicPr>
+            <a:picLocks noGrp="1" noChangeAspect="1"/>
+          </p:cNvPicPr>
+          <p:nvPr/>
+        </p:nvPicPr>
+        <p:blipFill>
+          <a:blip r:embed="rId2"/>
+          <a:stretch>
+            <a:fillRect/>
+          </a:stretch>
+        </p:blipFill>
+        <p:spPr bwMode="auto">
+          <a:xfrm>
+            <a:off x="1752600" y="1600200"/>
+            <a:ext cx="5651500" cy="4521200"/>
+          </a:xfrm>
+          <a:prstGeom prst="rect">
+            <a:avLst/>
+          </a:prstGeom>
+          <a:noFill/>
+          <a:ln w="9525">
+            <a:noFill/>
+            <a:headEnd/>
+            <a:tailEnd/>
+          </a:ln>
+        </p:spPr>
+      </p:pic>
+    </p:spTree>
+  </p:cSld>
+</p:sld>
+</file>
+
+<file path=ppt/slides/slide17.xml><?xml version="1.0" encoding="utf-8"?>
+<p:sld xmlns:a="http://schemas.openxmlformats.org/drawingml/2006/main" xmlns:r="http://schemas.openxmlformats.org/officeDocument/2006/relationships" xmlns:p="http://schemas.openxmlformats.org/presentationml/2006/main">
+  <p:cSld>
+    <p:spTree>
+      <p:nvGrpSpPr>
+        <p:cNvPr id="1" name=""/>
+        <p:cNvGrpSpPr/>
+        <p:nvPr/>
+      </p:nvGrpSpPr>
+      <p:grpSpPr>
+        <a:xfrm>
+          <a:off x="0" y="0"/>
+          <a:ext cx="0" cy="0"/>
+          <a:chOff x="0" y="0"/>
+          <a:chExt cx="0" cy="0"/>
+        </a:xfrm>
+      </p:grpSpPr>
+      <p:pic>
+        <p:nvPicPr>
+          <p:cNvPr descr="Presentation_RMD_files/figure-pptx/unnamed-chunk-11-1.png" id="0" name="Picture 1"/>
+          <p:cNvPicPr>
+            <a:picLocks noGrp="1" noChangeAspect="1"/>
+          </p:cNvPicPr>
+          <p:nvPr/>
+        </p:nvPicPr>
+        <p:blipFill>
+          <a:blip r:embed="rId2"/>
+          <a:stretch>
+            <a:fillRect/>
+          </a:stretch>
+        </p:blipFill>
+        <p:spPr bwMode="auto">
+          <a:xfrm>
+            <a:off x="1752600" y="1600200"/>
+            <a:ext cx="5651500" cy="4521200"/>
+          </a:xfrm>
+          <a:prstGeom prst="rect">
+            <a:avLst/>
+          </a:prstGeom>
+          <a:noFill/>
+          <a:ln w="9525">
+            <a:noFill/>
+            <a:headEnd/>
+            <a:tailEnd/>
+          </a:ln>
+        </p:spPr>
+      </p:pic>
+    </p:spTree>
+  </p:cSld>
+</p:sld>
+</file>
+
+<file path=ppt/slides/slide18.xml><?xml version="1.0" encoding="utf-8"?>
+<p:sld xmlns:a="http://schemas.openxmlformats.org/drawingml/2006/main" xmlns:r="http://schemas.openxmlformats.org/officeDocument/2006/relationships" xmlns:p="http://schemas.openxmlformats.org/presentationml/2006/main">
+  <p:cSld>
+    <p:spTree>
+      <p:nvGrpSpPr>
+        <p:cNvPr id="1" name=""/>
+        <p:cNvGrpSpPr/>
+        <p:nvPr/>
+      </p:nvGrpSpPr>
+      <p:grpSpPr>
+        <a:xfrm>
+          <a:off x="0" y="0"/>
+          <a:ext cx="0" cy="0"/>
+          <a:chOff x="0" y="0"/>
+          <a:chExt cx="0" cy="0"/>
+        </a:xfrm>
+      </p:grpSpPr>
       <p:sp>
         <p:nvSpPr>
           <p:cNvPr id="2" name="Title 1"/>
@@ -3892,7 +3855,23 @@
             </a:pPr>
             <a:r>
               <a:rPr/>
-              <a:t>Conclusion</a:t>
+              <a:t>Summarize</a:t>
+            </a:r>
+            <a:r>
+              <a:rPr/>
+              <a:t> </a:t>
+            </a:r>
+            <a:r>
+              <a:rPr/>
+              <a:t>the</a:t>
+            </a:r>
+            <a:r>
+              <a:rPr/>
+              <a:t> </a:t>
+            </a:r>
+            <a:r>
+              <a:rPr/>
+              <a:t>Model</a:t>
             </a:r>
           </a:p>
         </p:txBody>
@@ -3913,19 +3892,140 @@
           <a:lstStyle/>
           <a:p>
             <a:pPr lvl="0" marL="0" indent="0">
+              <a:spcBef>
+                <a:spcPts val="3000"/>
+              </a:spcBef>
               <a:buNone/>
             </a:pPr>
             <a:r>
-              <a:rPr/>
-              <a:t>Stimulus checks seem to encourage consumer spending, unsurprisingly. </a:t>
-            </a:r>
-            <a:r>
-              <a:rPr i="1"/>
-              <a:t>Assuming</a:t>
-            </a:r>
-            <a:r>
-              <a:rPr/>
-              <a:t> that high consumer spending attributes to a healthier economy, we can conclude that stimulus checks will encourage more new job openings that offer higher wages.</a:t>
+              <a:rPr b="1"/>
+              <a:t>It’s really bad, to be blunt.</a:t>
+            </a:r>
+          </a:p>
+          <a:p>
+            <a:pPr lvl="0" marL="0" indent="0">
+              <a:spcBef>
+                <a:spcPts val="3000"/>
+              </a:spcBef>
+              <a:buNone/>
+            </a:pPr>
+            <a:r>
+              <a:rPr b="1"/>
+              <a:t>Possible Better Models</a:t>
+            </a:r>
+          </a:p>
+          <a:p>
+            <a:pPr lvl="1"/>
+            <a:r>
+              <a:rPr/>
+              <a:t>Neural Networks</a:t>
+            </a:r>
+          </a:p>
+          <a:p>
+            <a:pPr lvl="1"/>
+            <a:r>
+              <a:rPr/>
+              <a:t>Decision Trees</a:t>
+            </a:r>
+          </a:p>
+          <a:p>
+            <a:pPr lvl="1"/>
+            <a:r>
+              <a:rPr/>
+              <a:t>Time Series Models (LSTM, RNN, etc.)</a:t>
+            </a:r>
+          </a:p>
+        </p:txBody>
+      </p:sp>
+    </p:spTree>
+  </p:cSld>
+</p:sld>
+</file>
+
+<file path=ppt/slides/slide19.xml><?xml version="1.0" encoding="utf-8"?>
+<p:sld xmlns:a="http://schemas.openxmlformats.org/drawingml/2006/main" xmlns:r="http://schemas.openxmlformats.org/officeDocument/2006/relationships" xmlns:p="http://schemas.openxmlformats.org/presentationml/2006/main">
+  <p:cSld>
+    <p:spTree>
+      <p:nvGrpSpPr>
+        <p:cNvPr id="1" name=""/>
+        <p:cNvGrpSpPr/>
+        <p:nvPr/>
+      </p:nvGrpSpPr>
+      <p:grpSpPr>
+        <a:xfrm>
+          <a:off x="0" y="0"/>
+          <a:ext cx="0" cy="0"/>
+          <a:chOff x="0" y="0"/>
+          <a:chExt cx="0" cy="0"/>
+        </a:xfrm>
+      </p:grpSpPr>
+      <p:sp>
+        <p:nvSpPr>
+          <p:cNvPr id="2" name="Title 1"/>
+          <p:cNvSpPr>
+            <a:spLocks noGrp="1"/>
+          </p:cNvSpPr>
+          <p:nvPr>
+            <p:ph type="title"/>
+          </p:nvPr>
+        </p:nvSpPr>
+        <p:spPr/>
+        <p:txBody>
+          <a:bodyPr/>
+          <a:lstStyle/>
+          <a:p>
+            <a:pPr lvl="0" marL="0" indent="0">
+              <a:buNone/>
+            </a:pPr>
+            <a:r>
+              <a:rPr/>
+              <a:t>Some</a:t>
+            </a:r>
+            <a:r>
+              <a:rPr/>
+              <a:t> </a:t>
+            </a:r>
+            <a:r>
+              <a:rPr/>
+              <a:t>Possible</a:t>
+            </a:r>
+            <a:r>
+              <a:rPr/>
+              <a:t> </a:t>
+            </a:r>
+            <a:r>
+              <a:rPr/>
+              <a:t>Biases</a:t>
+            </a:r>
+          </a:p>
+        </p:txBody>
+      </p:sp>
+      <p:sp>
+        <p:nvSpPr>
+          <p:cNvPr id="3" name="Content Placeholder 2"/>
+          <p:cNvSpPr>
+            <a:spLocks noGrp="1"/>
+          </p:cNvSpPr>
+          <p:nvPr>
+            <p:ph idx="1"/>
+          </p:nvPr>
+        </p:nvSpPr>
+        <p:spPr/>
+        <p:txBody>
+          <a:bodyPr/>
+          <a:lstStyle/>
+          <a:p>
+            <a:pPr lvl="1"/>
+            <a:r>
+              <a:rPr/>
+              <a:t>Movement data only comes from Google</a:t>
+            </a:r>
+          </a:p>
+          <a:p>
+            <a:pPr lvl="1"/>
+            <a:r>
+              <a:rPr/>
+              <a:t>Effect of stimulus checks won’t fade, because of the way we encoded the data.</a:t>
             </a:r>
           </a:p>
         </p:txBody>
@@ -4038,6 +4138,120 @@
             <a:r>
               <a:rPr/>
               <a:t>(using high customer spending as a proxy for economic health)</a:t>
+            </a:r>
+          </a:p>
+        </p:txBody>
+      </p:sp>
+    </p:spTree>
+  </p:cSld>
+</p:sld>
+</file>
+
+<file path=ppt/slides/slide20.xml><?xml version="1.0" encoding="utf-8"?>
+<p:sld xmlns:a="http://schemas.openxmlformats.org/drawingml/2006/main" xmlns:r="http://schemas.openxmlformats.org/officeDocument/2006/relationships" xmlns:p="http://schemas.openxmlformats.org/presentationml/2006/main">
+  <p:cSld>
+    <p:spTree>
+      <p:nvGrpSpPr>
+        <p:cNvPr id="1" name=""/>
+        <p:cNvGrpSpPr/>
+        <p:nvPr/>
+      </p:nvGrpSpPr>
+      <p:grpSpPr>
+        <a:xfrm>
+          <a:off x="0" y="0"/>
+          <a:ext cx="0" cy="0"/>
+          <a:chOff x="0" y="0"/>
+          <a:chExt cx="0" cy="0"/>
+        </a:xfrm>
+      </p:grpSpPr>
+      <p:sp>
+        <p:nvSpPr>
+          <p:cNvPr id="2" name="Title 1"/>
+          <p:cNvSpPr>
+            <a:spLocks noGrp="1"/>
+          </p:cNvSpPr>
+          <p:nvPr>
+            <p:ph type="title"/>
+          </p:nvPr>
+        </p:nvSpPr>
+        <p:spPr/>
+        <p:txBody>
+          <a:bodyPr/>
+          <a:lstStyle/>
+          <a:p>
+            <a:pPr lvl="0" marL="0" indent="0">
+              <a:buNone/>
+            </a:pPr>
+            <a:r>
+              <a:rPr/>
+              <a:t>Conclusion</a:t>
+            </a:r>
+          </a:p>
+        </p:txBody>
+      </p:sp>
+      <p:sp>
+        <p:nvSpPr>
+          <p:cNvPr id="3" name="Content Placeholder 2"/>
+          <p:cNvSpPr>
+            <a:spLocks noGrp="1"/>
+          </p:cNvSpPr>
+          <p:nvPr>
+            <p:ph idx="1"/>
+          </p:nvPr>
+        </p:nvSpPr>
+        <p:spPr/>
+        <p:txBody>
+          <a:bodyPr/>
+          <a:lstStyle/>
+          <a:p>
+            <a:pPr lvl="0" marL="0" indent="0">
+              <a:buNone/>
+            </a:pPr>
+            <a:r>
+              <a:rPr/>
+              <a:t>Stimulus checks -&gt; Higher Consumer Spending</a:t>
+            </a:r>
+          </a:p>
+          <a:p>
+            <a:pPr lvl="0" marL="0" indent="0">
+              <a:spcBef>
+                <a:spcPts val="3000"/>
+              </a:spcBef>
+              <a:buNone/>
+            </a:pPr>
+            <a:r>
+              <a:rPr b="1"/>
+              <a:t>Therefore,</a:t>
+            </a:r>
+          </a:p>
+          <a:p>
+            <a:pPr lvl="0" marL="0" indent="0">
+              <a:buNone/>
+            </a:pPr>
+            <a:r>
+              <a:rPr b="1"/>
+              <a:t>IF</a:t>
+            </a:r>
+            <a:r>
+              <a:rPr/>
+              <a:t> Higher Consumer Spending -&gt; Healthier Economy </a:t>
+            </a:r>
+            <a:r>
+              <a:rPr i="1"/>
+              <a:t>(needs separate analysis)</a:t>
+            </a:r>
+          </a:p>
+          <a:p>
+            <a:pPr lvl="0" marL="0" indent="0">
+              <a:buNone/>
+            </a:pPr>
+            <a:r>
+              <a:rPr b="1"/>
+              <a:t>THEN</a:t>
+            </a:r>
+            <a:r>
+              <a:rPr/>
+              <a:t> Stimulus Checks -&gt; More Jobs and Better Jobs</a:t>
             </a:r>
           </a:p>
         </p:txBody>

</xml_diff>